<commit_message>
updates with finished 3 decision coin flips
</commit_message>
<xml_diff>
--- a/FinalProjectPresentation.pptx
+++ b/FinalProjectPresentation.pptx
@@ -7738,6 +7738,13 @@
   <p:clrMapOvr>
     <a:masterClrMapping/>
   </p:clrMapOvr>
+  <p:timing>
+    <p:tnLst>
+      <p:par>
+        <p:cTn id="1" dur="indefinite" restart="never" nodeType="tmRoot"/>
+      </p:par>
+    </p:tnLst>
+  </p:timing>
 </p:sld>
 </file>
 
@@ -7843,6 +7850,13 @@
   <p:clrMapOvr>
     <a:masterClrMapping/>
   </p:clrMapOvr>
+  <p:timing>
+    <p:tnLst>
+      <p:par>
+        <p:cTn id="1" dur="indefinite" restart="never" nodeType="tmRoot"/>
+      </p:par>
+    </p:tnLst>
+  </p:timing>
 </p:sld>
 </file>
 
@@ -7915,18 +7929,55 @@
           <a:p>
             <a:r>
               <a:rPr lang="en-US" dirty="0" smtClean="0"/>
-              <a:t>Local Southern California</a:t>
-            </a:r>
-          </a:p>
-          <a:p>
+              <a:t>2</a:t>
+            </a:r>
+            <a:r>
+              <a:rPr lang="en-US" baseline="30000" dirty="0" smtClean="0"/>
+              <a:t>nd</a:t>
+            </a:r>
             <a:r>
               <a:rPr lang="en-US" dirty="0" smtClean="0"/>
-              <a:t>Love food, movies, and friends</a:t>
-            </a:r>
-            <a:endParaRPr lang="en-US" dirty="0"/>
-          </a:p>
-        </p:txBody>
-      </p:sp>
+              <a:t> Year at CGU</a:t>
+            </a:r>
+          </a:p>
+          <a:p>
+            <a:r>
+              <a:rPr lang="en-US" dirty="0" smtClean="0"/>
+              <a:t>Love friends, movies, and food</a:t>
+            </a:r>
+            <a:endParaRPr lang="en-US" dirty="0"/>
+          </a:p>
+        </p:txBody>
+      </p:sp>
+      <p:pic>
+        <p:nvPicPr>
+          <p:cNvPr id="5" name="Picture 4"/>
+          <p:cNvPicPr>
+            <a:picLocks noChangeAspect="1"/>
+          </p:cNvPicPr>
+          <p:nvPr/>
+        </p:nvPicPr>
+        <p:blipFill rotWithShape="1">
+          <a:blip r:embed="rId2">
+            <a:extLst>
+              <a:ext uri="{28A0092B-C50C-407E-A947-70E740481C1C}">
+                <a14:useLocalDpi xmlns:a14="http://schemas.microsoft.com/office/drawing/2010/main" val="0"/>
+              </a:ext>
+            </a:extLst>
+          </a:blip>
+          <a:srcRect l="26065" t="2516" r="22877" b="12118"/>
+          <a:stretch/>
+        </p:blipFill>
+        <p:spPr>
+          <a:xfrm>
+            <a:off x="7292898" y="2336873"/>
+            <a:ext cx="2341757" cy="3915358"/>
+          </a:xfrm>
+          <a:prstGeom prst="rect">
+            <a:avLst/>
+          </a:prstGeom>
+        </p:spPr>
+      </p:pic>
     </p:spTree>
     <p:extLst>
       <p:ext uri="{BB962C8B-B14F-4D97-AF65-F5344CB8AC3E}">
@@ -7937,6 +7988,13 @@
   <p:clrMapOvr>
     <a:masterClrMapping/>
   </p:clrMapOvr>
+  <p:timing>
+    <p:tnLst>
+      <p:par>
+        <p:cTn id="1" dur="indefinite" restart="never" nodeType="tmRoot"/>
+      </p:par>
+    </p:tnLst>
+  </p:timing>
 </p:sld>
 </file>
 
@@ -8006,19 +8064,101 @@
               <a:t>*Can’t make a decision*</a:t>
             </a:r>
           </a:p>
-          <a:p>
-            <a:r>
-              <a:rPr lang="en-US" dirty="0" smtClean="0"/>
-              <a:t>Even more hangry!</a:t>
-            </a:r>
-          </a:p>
-          <a:p>
-            <a:endParaRPr lang="en-US" dirty="0"/>
-          </a:p>
-          <a:p>
-            <a:r>
-              <a:rPr lang="en-US" dirty="0" smtClean="0"/>
-              <a:t>“Wish there was a way we could have someone/something choose randomly for us!”</a:t>
+        </p:txBody>
+      </p:sp>
+      <p:pic>
+        <p:nvPicPr>
+          <p:cNvPr id="4" name="Picture 3"/>
+          <p:cNvPicPr>
+            <a:picLocks noChangeAspect="1"/>
+          </p:cNvPicPr>
+          <p:nvPr/>
+        </p:nvPicPr>
+        <p:blipFill rotWithShape="1">
+          <a:blip r:embed="rId2">
+            <a:extLst>
+              <a:ext uri="{28A0092B-C50C-407E-A947-70E740481C1C}">
+                <a14:useLocalDpi xmlns:a14="http://schemas.microsoft.com/office/drawing/2010/main" val="0"/>
+              </a:ext>
+            </a:extLst>
+          </a:blip>
+          <a:srcRect l="11016" t="16423" r="28374" b="31057"/>
+          <a:stretch/>
+        </p:blipFill>
+        <p:spPr>
+          <a:xfrm rot="20651673">
+            <a:off x="695637" y="3789192"/>
+            <a:ext cx="3424275" cy="2225435"/>
+          </a:xfrm>
+          <a:prstGeom prst="rect">
+            <a:avLst/>
+          </a:prstGeom>
+        </p:spPr>
+      </p:pic>
+      <p:pic>
+        <p:nvPicPr>
+          <p:cNvPr id="5" name="Picture 4"/>
+          <p:cNvPicPr>
+            <a:picLocks noChangeAspect="1"/>
+          </p:cNvPicPr>
+          <p:nvPr/>
+        </p:nvPicPr>
+        <p:blipFill>
+          <a:blip r:embed="rId3">
+            <a:extLst>
+              <a:ext uri="{28A0092B-C50C-407E-A947-70E740481C1C}">
+                <a14:useLocalDpi xmlns:a14="http://schemas.microsoft.com/office/drawing/2010/main" val="0"/>
+              </a:ext>
+            </a:extLst>
+          </a:blip>
+          <a:stretch>
+            <a:fillRect/>
+          </a:stretch>
+        </p:blipFill>
+        <p:spPr>
+          <a:xfrm>
+            <a:off x="4844395" y="3034694"/>
+            <a:ext cx="6563302" cy="3404202"/>
+          </a:xfrm>
+          <a:prstGeom prst="rect">
+            <a:avLst/>
+          </a:prstGeom>
+        </p:spPr>
+      </p:pic>
+      <p:sp>
+        <p:nvSpPr>
+          <p:cNvPr id="6" name="TextBox 5"/>
+          <p:cNvSpPr txBox="1"/>
+          <p:nvPr/>
+        </p:nvSpPr>
+        <p:spPr>
+          <a:xfrm>
+            <a:off x="4581278" y="2141034"/>
+            <a:ext cx="6636850" cy="1107996"/>
+          </a:xfrm>
+          <a:prstGeom prst="rect">
+            <a:avLst/>
+          </a:prstGeom>
+          <a:noFill/>
+        </p:spPr>
+        <p:txBody>
+          <a:bodyPr wrap="square" rtlCol="0">
+            <a:spAutoFit/>
+          </a:bodyPr>
+          <a:lstStyle/>
+          <a:p>
+            <a:pPr algn="ctr"/>
+            <a:r>
+              <a:rPr lang="en-US" sz="2400" dirty="0"/>
+              <a:t>“I wish there was a way we could </a:t>
+            </a:r>
+            <a:r>
+              <a:rPr lang="en-US" sz="2400" dirty="0" smtClean="0"/>
+              <a:t>have something choose </a:t>
+            </a:r>
+            <a:r>
+              <a:rPr lang="en-US" sz="2400" dirty="0"/>
+              <a:t>randomly for us!”</a:t>
             </a:r>
           </a:p>
           <a:p>
@@ -8036,6 +8176,13 @@
   <p:clrMapOvr>
     <a:masterClrMapping/>
   </p:clrMapOvr>
+  <p:timing>
+    <p:tnLst>
+      <p:par>
+        <p:cTn id="1" dur="indefinite" restart="never" nodeType="tmRoot"/>
+      </p:par>
+    </p:tnLst>
+  </p:timing>
 </p:sld>
 </file>
 
@@ -8091,13 +8238,45 @@
         </p:nvSpPr>
         <p:spPr/>
         <p:txBody>
-          <a:bodyPr/>
+          <a:bodyPr>
+            <a:normAutofit fontScale="92500" lnSpcReduction="10000"/>
+          </a:bodyPr>
           <a:lstStyle/>
           <a:p>
             <a:r>
               <a:rPr lang="en-US" dirty="0" smtClean="0"/>
-              <a:t>Thought of all the programs we used in our class</a:t>
-            </a:r>
+              <a:t>Remembered all the programs we did for homework</a:t>
+            </a:r>
+          </a:p>
+          <a:p>
+            <a:pPr lvl="1"/>
+            <a:r>
+              <a:rPr lang="en-US" dirty="0" smtClean="0"/>
+              <a:t>Flip a coin</a:t>
+            </a:r>
+          </a:p>
+          <a:p>
+            <a:pPr lvl="1"/>
+            <a:r>
+              <a:rPr lang="en-US" dirty="0" smtClean="0"/>
+              <a:t>Rock, paper, scissors</a:t>
+            </a:r>
+          </a:p>
+          <a:p>
+            <a:pPr lvl="1"/>
+            <a:r>
+              <a:rPr lang="en-US" dirty="0"/>
+              <a:t>Rock, paper, </a:t>
+            </a:r>
+            <a:r>
+              <a:rPr lang="en-US" dirty="0" smtClean="0"/>
+              <a:t>scissors, lizard, </a:t>
+            </a:r>
+            <a:r>
+              <a:rPr lang="en-US" dirty="0" err="1" smtClean="0"/>
+              <a:t>spock</a:t>
+            </a:r>
+            <a:endParaRPr lang="en-US" dirty="0"/>
           </a:p>
           <a:p>
             <a:r>
@@ -8128,7 +8307,15 @@
             </a:r>
             <a:r>
               <a:rPr lang="en-US" dirty="0" smtClean="0"/>
-              <a:t> (), etc.</a:t>
+              <a:t> (), </a:t>
+            </a:r>
+            <a:r>
+              <a:rPr lang="en-US" dirty="0" err="1" smtClean="0"/>
+              <a:t>random.shuffle</a:t>
+            </a:r>
+            <a:r>
+              <a:rPr lang="en-US" dirty="0" smtClean="0"/>
+              <a:t>(), etc.</a:t>
             </a:r>
           </a:p>
           <a:p>
@@ -8173,6 +8360,13 @@
   <p:clrMapOvr>
     <a:masterClrMapping/>
   </p:clrMapOvr>
+  <p:timing>
+    <p:tnLst>
+      <p:par>
+        <p:cTn id="1" dur="indefinite" restart="never" nodeType="tmRoot"/>
+      </p:par>
+    </p:tnLst>
+  </p:timing>
 </p:sld>
 </file>
 
@@ -8232,7 +8426,7 @@
           <a:bodyPr/>
           <a:lstStyle/>
           <a:p>
-            <a:endParaRPr lang="en-US"/>
+            <a:endParaRPr lang="en-US" dirty="0"/>
           </a:p>
         </p:txBody>
       </p:sp>
@@ -8246,6 +8440,13 @@
   <p:clrMapOvr>
     <a:masterClrMapping/>
   </p:clrMapOvr>
+  <p:timing>
+    <p:tnLst>
+      <p:par>
+        <p:cTn id="1" dur="indefinite" restart="never" nodeType="tmRoot"/>
+      </p:par>
+    </p:tnLst>
+  </p:timing>
 </p:sld>
 </file>
 
@@ -8306,13 +8507,19 @@
           <a:p>
             <a:r>
               <a:rPr lang="en-US" dirty="0" smtClean="0"/>
+              <a:t>Clean/refactor</a:t>
+            </a:r>
+          </a:p>
+          <a:p>
+            <a:r>
+              <a:rPr lang="en-US" dirty="0" smtClean="0"/>
               <a:t>Finish more types of decisions</a:t>
             </a:r>
           </a:p>
           <a:p>
             <a:r>
               <a:rPr lang="en-US" dirty="0" smtClean="0"/>
-              <a:t>GUI?</a:t>
+              <a:t>Use more of “Random” Library</a:t>
             </a:r>
           </a:p>
           <a:p>
@@ -8326,6 +8533,66 @@
           </a:p>
         </p:txBody>
       </p:sp>
+      <p:pic>
+        <p:nvPicPr>
+          <p:cNvPr id="4" name="Picture 3"/>
+          <p:cNvPicPr>
+            <a:picLocks noChangeAspect="1"/>
+          </p:cNvPicPr>
+          <p:nvPr/>
+        </p:nvPicPr>
+        <p:blipFill>
+          <a:blip r:embed="rId2">
+            <a:extLst>
+              <a:ext uri="{28A0092B-C50C-407E-A947-70E740481C1C}">
+                <a14:useLocalDpi xmlns:a14="http://schemas.microsoft.com/office/drawing/2010/main" val="0"/>
+              </a:ext>
+            </a:extLst>
+          </a:blip>
+          <a:stretch>
+            <a:fillRect/>
+          </a:stretch>
+        </p:blipFill>
+        <p:spPr>
+          <a:xfrm>
+            <a:off x="5487251" y="2071415"/>
+            <a:ext cx="6304453" cy="4544620"/>
+          </a:xfrm>
+          <a:prstGeom prst="rect">
+            <a:avLst/>
+          </a:prstGeom>
+        </p:spPr>
+      </p:pic>
+      <p:pic>
+        <p:nvPicPr>
+          <p:cNvPr id="5" name="Picture 4"/>
+          <p:cNvPicPr>
+            <a:picLocks noChangeAspect="1"/>
+          </p:cNvPicPr>
+          <p:nvPr/>
+        </p:nvPicPr>
+        <p:blipFill>
+          <a:blip r:embed="rId3">
+            <a:extLst>
+              <a:ext uri="{28A0092B-C50C-407E-A947-70E740481C1C}">
+                <a14:useLocalDpi xmlns:a14="http://schemas.microsoft.com/office/drawing/2010/main" val="0"/>
+              </a:ext>
+            </a:extLst>
+          </a:blip>
+          <a:stretch>
+            <a:fillRect/>
+          </a:stretch>
+        </p:blipFill>
+        <p:spPr>
+          <a:xfrm>
+            <a:off x="1255916" y="4374872"/>
+            <a:ext cx="1826775" cy="1826775"/>
+          </a:xfrm>
+          <a:prstGeom prst="rect">
+            <a:avLst/>
+          </a:prstGeom>
+        </p:spPr>
+      </p:pic>
     </p:spTree>
     <p:extLst>
       <p:ext uri="{BB962C8B-B14F-4D97-AF65-F5344CB8AC3E}">
@@ -8336,6 +8603,13 @@
   <p:clrMapOvr>
     <a:masterClrMapping/>
   </p:clrMapOvr>
+  <p:timing>
+    <p:tnLst>
+      <p:par>
+        <p:cTn id="1" dur="indefinite" restart="never" nodeType="tmRoot"/>
+      </p:par>
+    </p:tnLst>
+  </p:timing>
 </p:sld>
 </file>
 
@@ -8409,6 +8683,13 @@
   <p:clrMapOvr>
     <a:masterClrMapping/>
   </p:clrMapOvr>
+  <p:timing>
+    <p:tnLst>
+      <p:par>
+        <p:cTn id="1" dur="indefinite" restart="never" nodeType="tmRoot"/>
+      </p:par>
+    </p:tnLst>
+  </p:timing>
 </p:sld>
 </file>
 

</xml_diff>